<commit_message>
Updates for NBT Block 3
</commit_message>
<xml_diff>
--- a/diagrams/neo-charm-2-0-10.pptx
+++ b/diagrams/neo-charm-2-0-10.pptx
@@ -9,7 +9,8 @@
     <p:sldId id="260" r:id="rId3"/>
     <p:sldId id="261" r:id="rId4"/>
     <p:sldId id="262" r:id="rId5"/>
-    <p:sldId id="263" r:id="rId6"/>
+    <p:sldId id="264" r:id="rId6"/>
+    <p:sldId id="263" r:id="rId7"/>
   </p:sldIdLst>
   <p:sldSz cx="12192000" cy="6858000"/>
   <p:notesSz cx="6858000" cy="9144000"/>
@@ -265,7 +266,7 @@
           <a:p>
             <a:fld id="{6D4529FC-AAC9-4C0D-A757-B06A5B751C9A}" type="datetimeFigureOut">
               <a:rPr lang="en-CA" smtClean="0"/>
-              <a:t>2018-05-22</a:t>
+              <a:t>2018-06-13</a:t>
             </a:fld>
             <a:endParaRPr lang="en-CA"/>
           </a:p>
@@ -465,7 +466,7 @@
           <a:p>
             <a:fld id="{6D4529FC-AAC9-4C0D-A757-B06A5B751C9A}" type="datetimeFigureOut">
               <a:rPr lang="en-CA" smtClean="0"/>
-              <a:t>2018-05-22</a:t>
+              <a:t>2018-06-13</a:t>
             </a:fld>
             <a:endParaRPr lang="en-CA"/>
           </a:p>
@@ -675,7 +676,7 @@
           <a:p>
             <a:fld id="{6D4529FC-AAC9-4C0D-A757-B06A5B751C9A}" type="datetimeFigureOut">
               <a:rPr lang="en-CA" smtClean="0"/>
-              <a:t>2018-05-22</a:t>
+              <a:t>2018-06-13</a:t>
             </a:fld>
             <a:endParaRPr lang="en-CA"/>
           </a:p>
@@ -875,7 +876,7 @@
           <a:p>
             <a:fld id="{6D4529FC-AAC9-4C0D-A757-B06A5B751C9A}" type="datetimeFigureOut">
               <a:rPr lang="en-CA" smtClean="0"/>
-              <a:t>2018-05-22</a:t>
+              <a:t>2018-06-13</a:t>
             </a:fld>
             <a:endParaRPr lang="en-CA"/>
           </a:p>
@@ -1151,7 +1152,7 @@
           <a:p>
             <a:fld id="{6D4529FC-AAC9-4C0D-A757-B06A5B751C9A}" type="datetimeFigureOut">
               <a:rPr lang="en-CA" smtClean="0"/>
-              <a:t>2018-05-22</a:t>
+              <a:t>2018-06-13</a:t>
             </a:fld>
             <a:endParaRPr lang="en-CA"/>
           </a:p>
@@ -1419,7 +1420,7 @@
           <a:p>
             <a:fld id="{6D4529FC-AAC9-4C0D-A757-B06A5B751C9A}" type="datetimeFigureOut">
               <a:rPr lang="en-CA" smtClean="0"/>
-              <a:t>2018-05-22</a:t>
+              <a:t>2018-06-13</a:t>
             </a:fld>
             <a:endParaRPr lang="en-CA"/>
           </a:p>
@@ -1834,7 +1835,7 @@
           <a:p>
             <a:fld id="{6D4529FC-AAC9-4C0D-A757-B06A5B751C9A}" type="datetimeFigureOut">
               <a:rPr lang="en-CA" smtClean="0"/>
-              <a:t>2018-05-22</a:t>
+              <a:t>2018-06-13</a:t>
             </a:fld>
             <a:endParaRPr lang="en-CA"/>
           </a:p>
@@ -1976,7 +1977,7 @@
           <a:p>
             <a:fld id="{6D4529FC-AAC9-4C0D-A757-B06A5B751C9A}" type="datetimeFigureOut">
               <a:rPr lang="en-CA" smtClean="0"/>
-              <a:t>2018-05-22</a:t>
+              <a:t>2018-06-13</a:t>
             </a:fld>
             <a:endParaRPr lang="en-CA"/>
           </a:p>
@@ -2089,7 +2090,7 @@
           <a:p>
             <a:fld id="{6D4529FC-AAC9-4C0D-A757-B06A5B751C9A}" type="datetimeFigureOut">
               <a:rPr lang="en-CA" smtClean="0"/>
-              <a:t>2018-05-22</a:t>
+              <a:t>2018-06-13</a:t>
             </a:fld>
             <a:endParaRPr lang="en-CA"/>
           </a:p>
@@ -2402,7 +2403,7 @@
           <a:p>
             <a:fld id="{6D4529FC-AAC9-4C0D-A757-B06A5B751C9A}" type="datetimeFigureOut">
               <a:rPr lang="en-CA" smtClean="0"/>
-              <a:t>2018-05-22</a:t>
+              <a:t>2018-06-13</a:t>
             </a:fld>
             <a:endParaRPr lang="en-CA"/>
           </a:p>
@@ -2691,7 +2692,7 @@
           <a:p>
             <a:fld id="{6D4529FC-AAC9-4C0D-A757-B06A5B751C9A}" type="datetimeFigureOut">
               <a:rPr lang="en-CA" smtClean="0"/>
-              <a:t>2018-05-22</a:t>
+              <a:t>2018-06-13</a:t>
             </a:fld>
             <a:endParaRPr lang="en-CA"/>
           </a:p>
@@ -2934,7 +2935,7 @@
           <a:p>
             <a:fld id="{6D4529FC-AAC9-4C0D-A757-B06A5B751C9A}" type="datetimeFigureOut">
               <a:rPr lang="en-CA" smtClean="0"/>
-              <a:t>2018-05-22</a:t>
+              <a:t>2018-06-13</a:t>
             </a:fld>
             <a:endParaRPr lang="en-CA"/>
           </a:p>
@@ -6056,6 +6057,50 @@
           </p:style>
         </p:cxnSp>
       </p:grpSp>
+      <p:sp>
+        <p:nvSpPr>
+          <p:cNvPr id="4" name="TextBox 3">
+            <a:extLst>
+              <a:ext uri="{FF2B5EF4-FFF2-40B4-BE49-F238E27FC236}">
+                <a16:creationId xmlns:a16="http://schemas.microsoft.com/office/drawing/2014/main" id="{4DB3E613-9A0C-46E9-BBBB-E9CF79ACD28B}"/>
+              </a:ext>
+            </a:extLst>
+          </p:cNvPr>
+          <p:cNvSpPr txBox="1"/>
+          <p:nvPr/>
+        </p:nvSpPr>
+        <p:spPr>
+          <a:xfrm>
+            <a:off x="8447314" y="856343"/>
+            <a:ext cx="2119086" cy="369332"/>
+          </a:xfrm>
+          <a:prstGeom prst="rect">
+            <a:avLst/>
+          </a:prstGeom>
+          <a:noFill/>
+        </p:spPr>
+        <p:txBody>
+          <a:bodyPr wrap="square" rtlCol="0">
+            <a:spAutoFit/>
+          </a:bodyPr>
+          <a:lstStyle/>
+          <a:p>
+            <a:r>
+              <a:rPr lang="en-CA" b="1" dirty="0">
+                <a:solidFill>
+                  <a:srgbClr val="FF0000"/>
+                </a:solidFill>
+              </a:rPr>
+              <a:t>OLD</a:t>
+            </a:r>
+            <a:endParaRPr lang="en-US" b="1" dirty="0">
+              <a:solidFill>
+                <a:srgbClr val="FF0000"/>
+              </a:solidFill>
+            </a:endParaRPr>
+          </a:p>
+        </p:txBody>
+      </p:sp>
     </p:spTree>
     <p:extLst>
       <p:ext uri="{BB962C8B-B14F-4D97-AF65-F5344CB8AC3E}">
@@ -6070,6 +6115,476 @@
 </file>
 
 <file path=ppt/slides/slide5.xml><?xml version="1.0" encoding="utf-8"?>
+<p:sld xmlns:a="http://schemas.openxmlformats.org/drawingml/2006/main" xmlns:r="http://schemas.openxmlformats.org/officeDocument/2006/relationships" xmlns:p="http://schemas.openxmlformats.org/presentationml/2006/main">
+  <p:cSld>
+    <p:spTree>
+      <p:nvGrpSpPr>
+        <p:cNvPr id="1" name=""/>
+        <p:cNvGrpSpPr/>
+        <p:nvPr/>
+      </p:nvGrpSpPr>
+      <p:grpSpPr>
+        <a:xfrm>
+          <a:off x="0" y="0"/>
+          <a:ext cx="0" cy="0"/>
+          <a:chOff x="0" y="0"/>
+          <a:chExt cx="0" cy="0"/>
+        </a:xfrm>
+      </p:grpSpPr>
+      <p:pic>
+        <p:nvPicPr>
+          <p:cNvPr id="4" name="Picture 3">
+            <a:extLst>
+              <a:ext uri="{FF2B5EF4-FFF2-40B4-BE49-F238E27FC236}">
+                <a16:creationId xmlns:a16="http://schemas.microsoft.com/office/drawing/2014/main" id="{4728614D-CC2A-4B8A-A9E6-BF62DA6D90C6}"/>
+              </a:ext>
+            </a:extLst>
+          </p:cNvPr>
+          <p:cNvPicPr>
+            <a:picLocks noChangeAspect="1"/>
+          </p:cNvPicPr>
+          <p:nvPr/>
+        </p:nvPicPr>
+        <p:blipFill>
+          <a:blip r:embed="rId2"/>
+          <a:stretch>
+            <a:fillRect/>
+          </a:stretch>
+        </p:blipFill>
+        <p:spPr>
+          <a:xfrm>
+            <a:off x="0" y="0"/>
+            <a:ext cx="7305748" cy="6858000"/>
+          </a:xfrm>
+          <a:prstGeom prst="rect">
+            <a:avLst/>
+          </a:prstGeom>
+        </p:spPr>
+      </p:pic>
+      <p:grpSp>
+        <p:nvGrpSpPr>
+          <p:cNvPr id="27" name="Group 26">
+            <a:extLst>
+              <a:ext uri="{FF2B5EF4-FFF2-40B4-BE49-F238E27FC236}">
+                <a16:creationId xmlns:a16="http://schemas.microsoft.com/office/drawing/2014/main" id="{6F055F8A-2D07-4A58-B380-33EE3AADC9D5}"/>
+              </a:ext>
+            </a:extLst>
+          </p:cNvPr>
+          <p:cNvGrpSpPr/>
+          <p:nvPr/>
+        </p:nvGrpSpPr>
+        <p:grpSpPr>
+          <a:xfrm>
+            <a:off x="4644575" y="4155116"/>
+            <a:ext cx="4897340" cy="1298106"/>
+            <a:chOff x="4644575" y="4155116"/>
+            <a:chExt cx="4897340" cy="1298106"/>
+          </a:xfrm>
+        </p:grpSpPr>
+        <p:sp>
+          <p:nvSpPr>
+            <p:cNvPr id="22" name="Rectangle 21">
+              <a:extLst>
+                <a:ext uri="{FF2B5EF4-FFF2-40B4-BE49-F238E27FC236}">
+                  <a16:creationId xmlns:a16="http://schemas.microsoft.com/office/drawing/2014/main" id="{20684C1F-017A-4D98-8249-669F5368BCE3}"/>
+                </a:ext>
+              </a:extLst>
+            </p:cNvPr>
+            <p:cNvSpPr/>
+            <p:nvPr/>
+          </p:nvSpPr>
+          <p:spPr>
+            <a:xfrm>
+              <a:off x="7547429" y="4155116"/>
+              <a:ext cx="1994486" cy="844083"/>
+            </a:xfrm>
+            <a:prstGeom prst="rect">
+              <a:avLst/>
+            </a:prstGeom>
+            <a:noFill/>
+          </p:spPr>
+          <p:style>
+            <a:lnRef idx="2">
+              <a:schemeClr val="accent1">
+                <a:shade val="50000"/>
+              </a:schemeClr>
+            </a:lnRef>
+            <a:fillRef idx="1">
+              <a:schemeClr val="accent1"/>
+            </a:fillRef>
+            <a:effectRef idx="0">
+              <a:schemeClr val="accent1"/>
+            </a:effectRef>
+            <a:fontRef idx="minor">
+              <a:schemeClr val="lt1"/>
+            </a:fontRef>
+          </p:style>
+          <p:txBody>
+            <a:bodyPr rtlCol="0" anchor="ctr"/>
+            <a:lstStyle/>
+            <a:p>
+              <a:pPr algn="ctr"/>
+              <a:r>
+                <a:rPr lang="en-CA" dirty="0">
+                  <a:solidFill>
+                    <a:srgbClr val="002060"/>
+                  </a:solidFill>
+                  <a:latin typeface="Trebuchet MS" panose="020B0603020202020204" pitchFamily="34" charset="0"/>
+                </a:rPr>
+                <a:t>Native</a:t>
+              </a:r>
+            </a:p>
+            <a:p>
+              <a:pPr algn="ctr"/>
+              <a:r>
+                <a:rPr lang="en-CA" dirty="0">
+                  <a:solidFill>
+                    <a:srgbClr val="002060"/>
+                  </a:solidFill>
+                  <a:latin typeface="Trebuchet MS" panose="020B0603020202020204" pitchFamily="34" charset="0"/>
+                </a:rPr>
+                <a:t>NEO VM Stack Representations</a:t>
+              </a:r>
+              <a:endParaRPr lang="en-US" dirty="0">
+                <a:solidFill>
+                  <a:srgbClr val="002060"/>
+                </a:solidFill>
+                <a:latin typeface="Trebuchet MS" panose="020B0603020202020204" pitchFamily="34" charset="0"/>
+              </a:endParaRPr>
+            </a:p>
+          </p:txBody>
+        </p:sp>
+        <p:cxnSp>
+          <p:nvCxnSpPr>
+            <p:cNvPr id="23" name="Straight Connector 22">
+              <a:extLst>
+                <a:ext uri="{FF2B5EF4-FFF2-40B4-BE49-F238E27FC236}">
+                  <a16:creationId xmlns:a16="http://schemas.microsoft.com/office/drawing/2014/main" id="{8B1CE159-401D-4CA4-9E62-76DD80F0F43D}"/>
+                </a:ext>
+              </a:extLst>
+            </p:cNvPr>
+            <p:cNvCxnSpPr>
+              <a:cxnSpLocks/>
+              <a:stCxn id="22" idx="1"/>
+            </p:cNvCxnSpPr>
+            <p:nvPr/>
+          </p:nvCxnSpPr>
+          <p:spPr>
+            <a:xfrm flipH="1">
+              <a:off x="4644575" y="4577158"/>
+              <a:ext cx="2902854" cy="296743"/>
+            </a:xfrm>
+            <a:prstGeom prst="line">
+              <a:avLst/>
+            </a:prstGeom>
+          </p:spPr>
+          <p:style>
+            <a:lnRef idx="1">
+              <a:schemeClr val="accent1"/>
+            </a:lnRef>
+            <a:fillRef idx="0">
+              <a:schemeClr val="accent1"/>
+            </a:fillRef>
+            <a:effectRef idx="0">
+              <a:schemeClr val="accent1"/>
+            </a:effectRef>
+            <a:fontRef idx="minor">
+              <a:schemeClr val="tx1"/>
+            </a:fontRef>
+          </p:style>
+        </p:cxnSp>
+        <p:cxnSp>
+          <p:nvCxnSpPr>
+            <p:cNvPr id="28" name="Straight Connector 27">
+              <a:extLst>
+                <a:ext uri="{FF2B5EF4-FFF2-40B4-BE49-F238E27FC236}">
+                  <a16:creationId xmlns:a16="http://schemas.microsoft.com/office/drawing/2014/main" id="{2B7CE57C-6AD9-40B8-83D7-38CA498703DE}"/>
+                </a:ext>
+              </a:extLst>
+            </p:cNvPr>
+            <p:cNvCxnSpPr>
+              <a:cxnSpLocks/>
+              <a:stCxn id="22" idx="1"/>
+            </p:cNvCxnSpPr>
+            <p:nvPr/>
+          </p:nvCxnSpPr>
+          <p:spPr>
+            <a:xfrm flipH="1">
+              <a:off x="5552943" y="4577158"/>
+              <a:ext cx="1994486" cy="876064"/>
+            </a:xfrm>
+            <a:prstGeom prst="line">
+              <a:avLst/>
+            </a:prstGeom>
+          </p:spPr>
+          <p:style>
+            <a:lnRef idx="1">
+              <a:schemeClr val="accent1"/>
+            </a:lnRef>
+            <a:fillRef idx="0">
+              <a:schemeClr val="accent1"/>
+            </a:fillRef>
+            <a:effectRef idx="0">
+              <a:schemeClr val="accent1"/>
+            </a:effectRef>
+            <a:fontRef idx="minor">
+              <a:schemeClr val="tx1"/>
+            </a:fontRef>
+          </p:style>
+        </p:cxnSp>
+      </p:grpSp>
+      <p:grpSp>
+        <p:nvGrpSpPr>
+          <p:cNvPr id="26" name="Group 25">
+            <a:extLst>
+              <a:ext uri="{FF2B5EF4-FFF2-40B4-BE49-F238E27FC236}">
+                <a16:creationId xmlns:a16="http://schemas.microsoft.com/office/drawing/2014/main" id="{E5B6EFDC-A9E9-4A51-93BF-6E4CDAB33F20}"/>
+              </a:ext>
+            </a:extLst>
+          </p:cNvPr>
+          <p:cNvGrpSpPr/>
+          <p:nvPr/>
+        </p:nvGrpSpPr>
+        <p:grpSpPr>
+          <a:xfrm>
+            <a:off x="3886200" y="2723704"/>
+            <a:ext cx="5655714" cy="1159319"/>
+            <a:chOff x="3886200" y="2723704"/>
+            <a:chExt cx="5655714" cy="1159319"/>
+          </a:xfrm>
+        </p:grpSpPr>
+        <p:cxnSp>
+          <p:nvCxnSpPr>
+            <p:cNvPr id="6" name="Straight Connector 5">
+              <a:extLst>
+                <a:ext uri="{FF2B5EF4-FFF2-40B4-BE49-F238E27FC236}">
+                  <a16:creationId xmlns:a16="http://schemas.microsoft.com/office/drawing/2014/main" id="{DAA98AAA-DE6E-4A80-B1FA-A0BD0B8D26CD}"/>
+                </a:ext>
+              </a:extLst>
+            </p:cNvPr>
+            <p:cNvCxnSpPr>
+              <a:cxnSpLocks/>
+              <a:stCxn id="11" idx="1"/>
+            </p:cNvCxnSpPr>
+            <p:nvPr/>
+          </p:nvCxnSpPr>
+          <p:spPr>
+            <a:xfrm flipH="1" flipV="1">
+              <a:off x="6429375" y="2809875"/>
+              <a:ext cx="1118053" cy="197084"/>
+            </a:xfrm>
+            <a:prstGeom prst="line">
+              <a:avLst/>
+            </a:prstGeom>
+          </p:spPr>
+          <p:style>
+            <a:lnRef idx="1">
+              <a:schemeClr val="accent1"/>
+            </a:lnRef>
+            <a:fillRef idx="0">
+              <a:schemeClr val="accent1"/>
+            </a:fillRef>
+            <a:effectRef idx="0">
+              <a:schemeClr val="accent1"/>
+            </a:effectRef>
+            <a:fontRef idx="minor">
+              <a:schemeClr val="tx1"/>
+            </a:fontRef>
+          </p:style>
+        </p:cxnSp>
+        <p:sp>
+          <p:nvSpPr>
+            <p:cNvPr id="11" name="Rectangle 10">
+              <a:extLst>
+                <a:ext uri="{FF2B5EF4-FFF2-40B4-BE49-F238E27FC236}">
+                  <a16:creationId xmlns:a16="http://schemas.microsoft.com/office/drawing/2014/main" id="{7544DF93-359C-4EFA-B88F-1A63795C153C}"/>
+                </a:ext>
+              </a:extLst>
+            </p:cNvPr>
+            <p:cNvSpPr/>
+            <p:nvPr/>
+          </p:nvSpPr>
+          <p:spPr>
+            <a:xfrm>
+              <a:off x="7547428" y="2723704"/>
+              <a:ext cx="1994486" cy="566510"/>
+            </a:xfrm>
+            <a:prstGeom prst="rect">
+              <a:avLst/>
+            </a:prstGeom>
+            <a:noFill/>
+          </p:spPr>
+          <p:style>
+            <a:lnRef idx="2">
+              <a:schemeClr val="accent1">
+                <a:shade val="50000"/>
+              </a:schemeClr>
+            </a:lnRef>
+            <a:fillRef idx="1">
+              <a:schemeClr val="accent1"/>
+            </a:fillRef>
+            <a:effectRef idx="0">
+              <a:schemeClr val="accent1"/>
+            </a:effectRef>
+            <a:fontRef idx="minor">
+              <a:schemeClr val="lt1"/>
+            </a:fontRef>
+          </p:style>
+          <p:txBody>
+            <a:bodyPr rtlCol="0" anchor="ctr"/>
+            <a:lstStyle/>
+            <a:p>
+              <a:pPr algn="ctr"/>
+              <a:r>
+                <a:rPr lang="en-CA" dirty="0">
+                  <a:solidFill>
+                    <a:srgbClr val="002060"/>
+                  </a:solidFill>
+                  <a:latin typeface="Trebuchet MS" panose="020B0603020202020204" pitchFamily="34" charset="0"/>
+                </a:rPr>
+                <a:t>JSON/RPC/HTTP</a:t>
+              </a:r>
+              <a:endParaRPr lang="en-US" dirty="0">
+                <a:solidFill>
+                  <a:srgbClr val="002060"/>
+                </a:solidFill>
+                <a:latin typeface="Trebuchet MS" panose="020B0603020202020204" pitchFamily="34" charset="0"/>
+              </a:endParaRPr>
+            </a:p>
+          </p:txBody>
+        </p:sp>
+        <p:cxnSp>
+          <p:nvCxnSpPr>
+            <p:cNvPr id="14" name="Straight Connector 13">
+              <a:extLst>
+                <a:ext uri="{FF2B5EF4-FFF2-40B4-BE49-F238E27FC236}">
+                  <a16:creationId xmlns:a16="http://schemas.microsoft.com/office/drawing/2014/main" id="{AF92C778-A1D4-4F1E-B27A-DADCD20F662B}"/>
+                </a:ext>
+              </a:extLst>
+            </p:cNvPr>
+            <p:cNvCxnSpPr>
+              <a:cxnSpLocks/>
+              <a:stCxn id="11" idx="1"/>
+            </p:cNvCxnSpPr>
+            <p:nvPr/>
+          </p:nvCxnSpPr>
+          <p:spPr>
+            <a:xfrm flipH="1">
+              <a:off x="3886200" y="3006959"/>
+              <a:ext cx="3661228" cy="844083"/>
+            </a:xfrm>
+            <a:prstGeom prst="line">
+              <a:avLst/>
+            </a:prstGeom>
+          </p:spPr>
+          <p:style>
+            <a:lnRef idx="1">
+              <a:schemeClr val="accent1"/>
+            </a:lnRef>
+            <a:fillRef idx="0">
+              <a:schemeClr val="accent1"/>
+            </a:fillRef>
+            <a:effectRef idx="0">
+              <a:schemeClr val="accent1"/>
+            </a:effectRef>
+            <a:fontRef idx="minor">
+              <a:schemeClr val="tx1"/>
+            </a:fontRef>
+          </p:style>
+        </p:cxnSp>
+        <p:cxnSp>
+          <p:nvCxnSpPr>
+            <p:cNvPr id="19" name="Straight Connector 18">
+              <a:extLst>
+                <a:ext uri="{FF2B5EF4-FFF2-40B4-BE49-F238E27FC236}">
+                  <a16:creationId xmlns:a16="http://schemas.microsoft.com/office/drawing/2014/main" id="{B080DDA3-0E31-4061-858D-BDA6ECF142A7}"/>
+                </a:ext>
+              </a:extLst>
+            </p:cNvPr>
+            <p:cNvCxnSpPr>
+              <a:cxnSpLocks/>
+              <a:stCxn id="11" idx="1"/>
+            </p:cNvCxnSpPr>
+            <p:nvPr/>
+          </p:nvCxnSpPr>
+          <p:spPr>
+            <a:xfrm flipH="1">
+              <a:off x="4644573" y="3006959"/>
+              <a:ext cx="2902855" cy="197084"/>
+            </a:xfrm>
+            <a:prstGeom prst="line">
+              <a:avLst/>
+            </a:prstGeom>
+          </p:spPr>
+          <p:style>
+            <a:lnRef idx="1">
+              <a:schemeClr val="accent1"/>
+            </a:lnRef>
+            <a:fillRef idx="0">
+              <a:schemeClr val="accent1"/>
+            </a:fillRef>
+            <a:effectRef idx="0">
+              <a:schemeClr val="accent1"/>
+            </a:effectRef>
+            <a:fontRef idx="minor">
+              <a:schemeClr val="tx1"/>
+            </a:fontRef>
+          </p:style>
+        </p:cxnSp>
+        <p:cxnSp>
+          <p:nvCxnSpPr>
+            <p:cNvPr id="20" name="Straight Connector 19">
+              <a:extLst>
+                <a:ext uri="{FF2B5EF4-FFF2-40B4-BE49-F238E27FC236}">
+                  <a16:creationId xmlns:a16="http://schemas.microsoft.com/office/drawing/2014/main" id="{F6B64FE6-3DA9-4727-8A46-32DF2016F798}"/>
+                </a:ext>
+              </a:extLst>
+            </p:cNvPr>
+            <p:cNvCxnSpPr>
+              <a:cxnSpLocks/>
+              <a:stCxn id="11" idx="1"/>
+            </p:cNvCxnSpPr>
+            <p:nvPr/>
+          </p:nvCxnSpPr>
+          <p:spPr>
+            <a:xfrm flipH="1">
+              <a:off x="5638800" y="3006959"/>
+              <a:ext cx="1908628" cy="876064"/>
+            </a:xfrm>
+            <a:prstGeom prst="line">
+              <a:avLst/>
+            </a:prstGeom>
+          </p:spPr>
+          <p:style>
+            <a:lnRef idx="1">
+              <a:schemeClr val="accent1"/>
+            </a:lnRef>
+            <a:fillRef idx="0">
+              <a:schemeClr val="accent1"/>
+            </a:fillRef>
+            <a:effectRef idx="0">
+              <a:schemeClr val="accent1"/>
+            </a:effectRef>
+            <a:fontRef idx="minor">
+              <a:schemeClr val="tx1"/>
+            </a:fontRef>
+          </p:style>
+        </p:cxnSp>
+      </p:grpSp>
+    </p:spTree>
+    <p:extLst>
+      <p:ext uri="{BB962C8B-B14F-4D97-AF65-F5344CB8AC3E}">
+        <p14:creationId xmlns:p14="http://schemas.microsoft.com/office/powerpoint/2010/main" val="756935247"/>
+      </p:ext>
+    </p:extLst>
+  </p:cSld>
+  <p:clrMapOvr>
+    <a:masterClrMapping/>
+  </p:clrMapOvr>
+</p:sld>
+</file>
+
+<file path=ppt/slides/slide6.xml><?xml version="1.0" encoding="utf-8"?>
 <p:sld xmlns:a="http://schemas.openxmlformats.org/drawingml/2006/main" xmlns:r="http://schemas.openxmlformats.org/officeDocument/2006/relationships" xmlns:p="http://schemas.openxmlformats.org/presentationml/2006/main">
   <p:cSld>
     <p:spTree>

</xml_diff>